<commit_message>
Edits to initial documentation
Edited codeScorePreview and initial scope statement
</commit_message>
<xml_diff>
--- a/codeScorePreview.pptx
+++ b/codeScorePreview.pptx
@@ -3863,11 +3863,7 @@
           <a:p>
             <a:r>
               <a:rPr lang="en-US" smtClean="0"/>
-              <a:t>Each team member: f</a:t>
-            </a:r>
-            <a:r>
-              <a:rPr lang="en-US" smtClean="0"/>
-              <a:t>ork </a:t>
+              <a:t>Each team member: fork </a:t>
             </a:r>
             <a:r>
               <a:rPr lang="en-US" dirty="0" smtClean="0"/>
@@ -4305,7 +4301,21 @@
             </a:r>
             <a:r>
               <a:rPr lang="en-US" dirty="0" smtClean="0"/>
-              <a:t> – Technical Guru</a:t>
+              <a:t> – Technical </a:t>
+            </a:r>
+            <a:r>
+              <a:rPr lang="en-US" dirty="0" smtClean="0"/>
+              <a:t>Guru</a:t>
+            </a:r>
+          </a:p>
+          <a:p>
+            <a:r>
+              <a:rPr lang="en-US" dirty="0" smtClean="0"/>
+              <a:t>You – </a:t>
+            </a:r>
+            <a:r>
+              <a:rPr lang="en-US" smtClean="0"/>
+              <a:t>Code Warriors!!!</a:t>
             </a:r>
             <a:endParaRPr lang="en-US" dirty="0"/>
           </a:p>
@@ -4328,7 +4338,11 @@
           <a:p>
             <a:r>
               <a:rPr lang="en-US" dirty="0" smtClean="0"/>
-              <a:t>Project Committee</a:t>
+              <a:t>Project </a:t>
+            </a:r>
+            <a:r>
+              <a:rPr lang="en-US" dirty="0" smtClean="0"/>
+              <a:t>Team</a:t>
             </a:r>
             <a:endParaRPr lang="en-US" dirty="0"/>
           </a:p>
@@ -4979,14 +4993,15 @@
         <p:spPr/>
         <p:txBody>
           <a:bodyPr>
-            <a:normAutofit/>
+            <a:normAutofit lnSpcReduction="10000"/>
           </a:bodyPr>
           <a:lstStyle/>
           <a:p>
             <a:r>
               <a:rPr lang="en-US" dirty="0" smtClean="0"/>
-              <a:t>Constraints:</a:t>
-            </a:r>
+              <a:t>Constraints/Limitations:</a:t>
+            </a:r>
+            <a:endParaRPr lang="en-US" dirty="0" smtClean="0"/>
           </a:p>
           <a:p>
             <a:pPr marL="640080" lvl="2">
@@ -5019,7 +5034,18 @@
             <a:pPr lvl="1"/>
             <a:r>
               <a:rPr lang="en-US" dirty="0"/>
-              <a:t>Only worked in Firefox on my end (in web server, ran fine)</a:t>
+              <a:t>Only worked in Firefox on my end </a:t>
+            </a:r>
+            <a:r>
+              <a:rPr lang="en-US" dirty="0" smtClean="0"/>
+              <a:t>when not running web server</a:t>
+            </a:r>
+          </a:p>
+          <a:p>
+            <a:pPr lvl="1"/>
+            <a:r>
+              <a:rPr lang="en-US" dirty="0" smtClean="0"/>
+              <a:t>Ran fine on my end when running web server</a:t>
             </a:r>
             <a:endParaRPr lang="en-US" dirty="0" smtClean="0"/>
           </a:p>
@@ -5172,13 +5198,8 @@
           <a:p>
             <a:r>
               <a:rPr lang="en-US" dirty="0" smtClean="0"/>
-              <a:t>Prepared this PowerPoint project </a:t>
-            </a:r>
-            <a:r>
-              <a:rPr lang="en-US" smtClean="0"/>
-              <a:t>summary preview</a:t>
-            </a:r>
-            <a:endParaRPr lang="en-US" dirty="0" smtClean="0"/>
+              <a:t>Prepared this PowerPoint project summary preview</a:t>
+            </a:r>
           </a:p>
           <a:p>
             <a:endParaRPr lang="en-US" dirty="0"/>

</xml_diff>

<commit_message>
Code Score baseline code and documentation
Prepared for Day of Service
</commit_message>
<xml_diff>
--- a/codeScorePreview.pptx
+++ b/codeScorePreview.pptx
@@ -3903,8 +3903,8 @@
           <a:p>
             <a:pPr lvl="1"/>
             <a:r>
-              <a:rPr lang="en-US" sz="1400" dirty="0"/>
-              <a:t>PHP </a:t>
+              <a:rPr lang="en-US" sz="1400" dirty="0" smtClean="0"/>
+              <a:t>Finish PHP </a:t>
             </a:r>
             <a:r>
               <a:rPr lang="en-US" sz="1400" dirty="0" smtClean="0"/>
@@ -3990,15 +3990,7 @@
             <a:pPr lvl="1"/>
             <a:r>
               <a:rPr lang="en-US" sz="1400" dirty="0" smtClean="0"/>
-              <a:t>Scroll boxes? Single page vs. multi-page? </a:t>
-            </a:r>
-            <a:r>
-              <a:rPr lang="en-US" sz="1400" dirty="0" smtClean="0"/>
-              <a:t>PHP/HTML or all PHP? Other </a:t>
-            </a:r>
-            <a:r>
-              <a:rPr lang="en-US" sz="1400" dirty="0" smtClean="0"/>
-              <a:t>edits?</a:t>
+              <a:t>Scroll boxes? Single page vs. multi-page? PHP/HTML or all PHP? Other edits?</a:t>
             </a:r>
           </a:p>
           <a:p>
@@ -5151,7 +5143,7 @@
         </p:spPr>
         <p:txBody>
           <a:bodyPr>
-            <a:normAutofit fontScale="92500" lnSpcReduction="10000"/>
+            <a:normAutofit fontScale="92500" lnSpcReduction="20000"/>
           </a:bodyPr>
           <a:lstStyle/>
           <a:p>
@@ -5191,8 +5183,15 @@
           <a:p>
             <a:r>
               <a:rPr lang="en-US" dirty="0" smtClean="0"/>
+              <a:t>Begun implementing PHP functionality</a:t>
+            </a:r>
+          </a:p>
+          <a:p>
+            <a:r>
+              <a:rPr lang="en-US" dirty="0" smtClean="0"/>
               <a:t>Wrote initial scope document</a:t>
             </a:r>
+            <a:endParaRPr lang="en-US" dirty="0" smtClean="0"/>
           </a:p>
           <a:p>
             <a:r>

</xml_diff>